<commit_message>
ismir 2015 1st revision + eusipco 2015 camera ready
</commit_message>
<xml_diff>
--- a/cw ismir2015/cw_ismir2015_plots.pptx
+++ b/cw ismir2015/cw_ismir2015_plots.pptx
@@ -295,7 +295,7 @@
           <a:p>
             <a:fld id="{8A0EEBEE-491D-0547-AD30-3CFBCD2A91CE}" type="datetimeFigureOut">
               <a:rPr kumimoji="1" lang="zh-TW" altLang="en-US" smtClean="0"/>
-              <a:t>4/22/15</a:t>
+              <a:t>7/9/15</a:t>
             </a:fld>
             <a:endParaRPr kumimoji="1" lang="zh-TW" altLang="en-US"/>
           </a:p>
@@ -465,7 +465,7 @@
           <a:p>
             <a:fld id="{8A0EEBEE-491D-0547-AD30-3CFBCD2A91CE}" type="datetimeFigureOut">
               <a:rPr kumimoji="1" lang="zh-TW" altLang="en-US" smtClean="0"/>
-              <a:t>4/22/15</a:t>
+              <a:t>7/9/15</a:t>
             </a:fld>
             <a:endParaRPr kumimoji="1" lang="zh-TW" altLang="en-US"/>
           </a:p>
@@ -645,7 +645,7 @@
           <a:p>
             <a:fld id="{8A0EEBEE-491D-0547-AD30-3CFBCD2A91CE}" type="datetimeFigureOut">
               <a:rPr kumimoji="1" lang="zh-TW" altLang="en-US" smtClean="0"/>
-              <a:t>4/22/15</a:t>
+              <a:t>7/9/15</a:t>
             </a:fld>
             <a:endParaRPr kumimoji="1" lang="zh-TW" altLang="en-US"/>
           </a:p>
@@ -815,7 +815,7 @@
           <a:p>
             <a:fld id="{8A0EEBEE-491D-0547-AD30-3CFBCD2A91CE}" type="datetimeFigureOut">
               <a:rPr kumimoji="1" lang="zh-TW" altLang="en-US" smtClean="0"/>
-              <a:t>4/22/15</a:t>
+              <a:t>7/9/15</a:t>
             </a:fld>
             <a:endParaRPr kumimoji="1" lang="zh-TW" altLang="en-US"/>
           </a:p>
@@ -1061,7 +1061,7 @@
           <a:p>
             <a:fld id="{8A0EEBEE-491D-0547-AD30-3CFBCD2A91CE}" type="datetimeFigureOut">
               <a:rPr kumimoji="1" lang="zh-TW" altLang="en-US" smtClean="0"/>
-              <a:t>4/22/15</a:t>
+              <a:t>7/9/15</a:t>
             </a:fld>
             <a:endParaRPr kumimoji="1" lang="zh-TW" altLang="en-US"/>
           </a:p>
@@ -1349,7 +1349,7 @@
           <a:p>
             <a:fld id="{8A0EEBEE-491D-0547-AD30-3CFBCD2A91CE}" type="datetimeFigureOut">
               <a:rPr kumimoji="1" lang="zh-TW" altLang="en-US" smtClean="0"/>
-              <a:t>4/22/15</a:t>
+              <a:t>7/9/15</a:t>
             </a:fld>
             <a:endParaRPr kumimoji="1" lang="zh-TW" altLang="en-US"/>
           </a:p>
@@ -1771,7 +1771,7 @@
           <a:p>
             <a:fld id="{8A0EEBEE-491D-0547-AD30-3CFBCD2A91CE}" type="datetimeFigureOut">
               <a:rPr kumimoji="1" lang="zh-TW" altLang="en-US" smtClean="0"/>
-              <a:t>4/22/15</a:t>
+              <a:t>7/9/15</a:t>
             </a:fld>
             <a:endParaRPr kumimoji="1" lang="zh-TW" altLang="en-US"/>
           </a:p>
@@ -1889,7 +1889,7 @@
           <a:p>
             <a:fld id="{8A0EEBEE-491D-0547-AD30-3CFBCD2A91CE}" type="datetimeFigureOut">
               <a:rPr kumimoji="1" lang="zh-TW" altLang="en-US" smtClean="0"/>
-              <a:t>4/22/15</a:t>
+              <a:t>7/9/15</a:t>
             </a:fld>
             <a:endParaRPr kumimoji="1" lang="zh-TW" altLang="en-US"/>
           </a:p>
@@ -1984,7 +1984,7 @@
           <a:p>
             <a:fld id="{8A0EEBEE-491D-0547-AD30-3CFBCD2A91CE}" type="datetimeFigureOut">
               <a:rPr kumimoji="1" lang="zh-TW" altLang="en-US" smtClean="0"/>
-              <a:t>4/22/15</a:t>
+              <a:t>7/9/15</a:t>
             </a:fld>
             <a:endParaRPr kumimoji="1" lang="zh-TW" altLang="en-US"/>
           </a:p>
@@ -2261,7 +2261,7 @@
           <a:p>
             <a:fld id="{8A0EEBEE-491D-0547-AD30-3CFBCD2A91CE}" type="datetimeFigureOut">
               <a:rPr kumimoji="1" lang="zh-TW" altLang="en-US" smtClean="0"/>
-              <a:t>4/22/15</a:t>
+              <a:t>7/9/15</a:t>
             </a:fld>
             <a:endParaRPr kumimoji="1" lang="zh-TW" altLang="en-US"/>
           </a:p>
@@ -2514,7 +2514,7 @@
           <a:p>
             <a:fld id="{8A0EEBEE-491D-0547-AD30-3CFBCD2A91CE}" type="datetimeFigureOut">
               <a:rPr kumimoji="1" lang="zh-TW" altLang="en-US" smtClean="0"/>
-              <a:t>4/22/15</a:t>
+              <a:t>7/9/15</a:t>
             </a:fld>
             <a:endParaRPr kumimoji="1" lang="zh-TW" altLang="en-US"/>
           </a:p>
@@ -2727,7 +2727,7 @@
           <a:p>
             <a:fld id="{8A0EEBEE-491D-0547-AD30-3CFBCD2A91CE}" type="datetimeFigureOut">
               <a:rPr kumimoji="1" lang="zh-TW" altLang="en-US" smtClean="0"/>
-              <a:t>4/22/15</a:t>
+              <a:t>7/9/15</a:t>
             </a:fld>
             <a:endParaRPr kumimoji="1" lang="zh-TW" altLang="en-US"/>
           </a:p>
@@ -6394,8 +6394,8 @@
         </p:nvSpPr>
         <p:spPr>
           <a:xfrm>
-            <a:off x="251817" y="3038194"/>
-            <a:ext cx="2160000" cy="1440000"/>
+            <a:off x="251817" y="3080529"/>
+            <a:ext cx="2160000" cy="1181804"/>
           </a:xfrm>
           <a:prstGeom prst="rect">
             <a:avLst/>
@@ -6439,7 +6439,7 @@
         </p:nvSpPr>
         <p:spPr>
           <a:xfrm>
-            <a:off x="1083896" y="3569693"/>
+            <a:off x="1083896" y="3468089"/>
             <a:ext cx="427046" cy="400110"/>
           </a:xfrm>
           <a:prstGeom prst="rect">
@@ -6475,7 +6475,7 @@
         </p:nvSpPr>
         <p:spPr>
           <a:xfrm>
-            <a:off x="2462152" y="3556662"/>
+            <a:off x="2462152" y="3446591"/>
             <a:ext cx="473596" cy="400110"/>
           </a:xfrm>
           <a:prstGeom prst="rect">
@@ -6505,7 +6505,7 @@
         </p:nvSpPr>
         <p:spPr>
           <a:xfrm>
-            <a:off x="2827589" y="3556662"/>
+            <a:off x="2827589" y="3480459"/>
             <a:ext cx="556996" cy="400110"/>
           </a:xfrm>
           <a:prstGeom prst="rect">
@@ -6548,8 +6548,8 @@
         </p:nvSpPr>
         <p:spPr>
           <a:xfrm rot="5400000">
-            <a:off x="2376544" y="3480661"/>
-            <a:ext cx="1440000" cy="540000"/>
+            <a:off x="2505642" y="3402365"/>
+            <a:ext cx="1181804" cy="540000"/>
           </a:xfrm>
           <a:prstGeom prst="rect">
             <a:avLst/>
@@ -6594,7 +6594,7 @@
         <p:spPr>
           <a:xfrm>
             <a:off x="4302605" y="3226165"/>
-            <a:ext cx="1080000" cy="1080000"/>
+            <a:ext cx="1080000" cy="886353"/>
           </a:xfrm>
           <a:prstGeom prst="rect">
             <a:avLst/>
@@ -6638,7 +6638,7 @@
         </p:nvSpPr>
         <p:spPr>
           <a:xfrm>
-            <a:off x="4651985" y="3551110"/>
+            <a:off x="4651985" y="3449506"/>
             <a:ext cx="309481" cy="400110"/>
           </a:xfrm>
           <a:prstGeom prst="rect">
@@ -6674,7 +6674,7 @@
         </p:nvSpPr>
         <p:spPr>
           <a:xfrm>
-            <a:off x="3367590" y="3564195"/>
+            <a:off x="3367590" y="3479525"/>
             <a:ext cx="556996" cy="400110"/>
           </a:xfrm>
           <a:prstGeom prst="rect">
@@ -6717,8 +6717,8 @@
         </p:nvSpPr>
         <p:spPr>
           <a:xfrm rot="5400000">
-            <a:off x="2918328" y="3479727"/>
-            <a:ext cx="1440000" cy="540000"/>
+            <a:off x="3047426" y="3401431"/>
+            <a:ext cx="1181804" cy="540000"/>
           </a:xfrm>
           <a:prstGeom prst="rect">
             <a:avLst/>
@@ -6762,7 +6762,7 @@
         </p:nvSpPr>
         <p:spPr>
           <a:xfrm>
-            <a:off x="956731" y="4464906"/>
+            <a:off x="956731" y="4261698"/>
             <a:ext cx="638679" cy="307777"/>
           </a:xfrm>
           <a:prstGeom prst="rect">
@@ -6798,7 +6798,7 @@
         </p:nvSpPr>
         <p:spPr>
           <a:xfrm>
-            <a:off x="3968431" y="3612276"/>
+            <a:off x="3968431" y="3502205"/>
             <a:ext cx="266807" cy="307777"/>
           </a:xfrm>
           <a:prstGeom prst="rect">
@@ -6836,7 +6836,7 @@
         </p:nvSpPr>
         <p:spPr>
           <a:xfrm>
-            <a:off x="5448272" y="3620819"/>
+            <a:off x="5448272" y="3510748"/>
             <a:ext cx="266807" cy="307777"/>
           </a:xfrm>
           <a:prstGeom prst="rect">
@@ -6874,8 +6874,8 @@
         </p:nvGrpSpPr>
         <p:grpSpPr>
           <a:xfrm>
-            <a:off x="5789122" y="3226165"/>
-            <a:ext cx="2160000" cy="1083583"/>
+            <a:off x="5789122" y="3226166"/>
+            <a:ext cx="2160000" cy="889294"/>
             <a:chOff x="5259456" y="3253738"/>
             <a:chExt cx="2160000" cy="1083583"/>
           </a:xfrm>
@@ -6933,7 +6933,7 @@
           </p:nvSpPr>
           <p:spPr>
             <a:xfrm>
-              <a:off x="6042794" y="3306390"/>
+              <a:off x="6085129" y="3306390"/>
               <a:ext cx="518609" cy="400110"/>
             </a:xfrm>
             <a:prstGeom prst="rect">
@@ -6976,7 +6976,7 @@
           </p:nvSpPr>
           <p:spPr>
             <a:xfrm>
-              <a:off x="6042794" y="3847461"/>
+              <a:off x="6068195" y="3847461"/>
               <a:ext cx="582054" cy="400110"/>
             </a:xfrm>
             <a:prstGeom prst="rect">
@@ -7065,7 +7065,7 @@
         </p:nvSpPr>
         <p:spPr>
           <a:xfrm>
-            <a:off x="2767393" y="4464906"/>
+            <a:off x="2767393" y="4261698"/>
             <a:ext cx="646331" cy="307777"/>
           </a:xfrm>
           <a:prstGeom prst="rect">
@@ -7122,7 +7122,7 @@
         </p:nvSpPr>
         <p:spPr>
           <a:xfrm>
-            <a:off x="3322347" y="4464906"/>
+            <a:off x="3322347" y="4261698"/>
             <a:ext cx="646331" cy="307777"/>
           </a:xfrm>
           <a:prstGeom prst="rect">
@@ -7179,7 +7179,7 @@
         </p:nvSpPr>
         <p:spPr>
           <a:xfrm>
-            <a:off x="4592716" y="4462447"/>
+            <a:off x="4592716" y="4259239"/>
             <a:ext cx="493770" cy="307777"/>
           </a:xfrm>
           <a:prstGeom prst="rect">
@@ -7237,7 +7237,7 @@
         </p:nvSpPr>
         <p:spPr>
           <a:xfrm>
-            <a:off x="6508430" y="4292439"/>
+            <a:off x="6516897" y="4089231"/>
             <a:ext cx="595573" cy="307777"/>
           </a:xfrm>
           <a:prstGeom prst="rect">
@@ -7302,7 +7302,7 @@
         </p:nvSpPr>
         <p:spPr>
           <a:xfrm>
-            <a:off x="6508430" y="4473941"/>
+            <a:off x="6516897" y="4270733"/>
             <a:ext cx="595573" cy="307777"/>
           </a:xfrm>
           <a:prstGeom prst="rect">

</xml_diff>